<commit_message>
No need pdf; qr code back to pptx
</commit_message>
<xml_diff>
--- a/week_1/week_1.pptx
+++ b/week_1/week_1.pptx
@@ -6286,10 +6286,10 @@
       </p:sp>
       <p:pic>
         <p:nvPicPr>
-          <p:cNvPr id="4" name="Picture 3">
+          <p:cNvPr id="8" name="Picture 7">
             <a:extLst>
               <a:ext uri="{FF2B5EF4-FFF2-40B4-BE49-F238E27FC236}">
-                <a16:creationId xmlns:a16="http://schemas.microsoft.com/office/drawing/2014/main" id="{035D5C4E-66F7-78D2-C06F-C372D104A01A}"/>
+                <a16:creationId xmlns:a16="http://schemas.microsoft.com/office/drawing/2014/main" id="{5AEC5D33-49EC-5C18-A406-6C8806E33682}"/>
               </a:ext>
             </a:extLst>
           </p:cNvPr>
@@ -6306,8 +6306,8 @@
         </p:blipFill>
         <p:spPr>
           <a:xfrm>
-            <a:off x="227012" y="203021"/>
-            <a:ext cx="1265358" cy="1265358"/>
+            <a:off x="261518" y="301763"/>
+            <a:ext cx="1409897" cy="1409897"/>
           </a:xfrm>
           <a:prstGeom prst="rect">
             <a:avLst/>
@@ -13075,7 +13075,7 @@
 
 <file path=ppt/webextensions/taskpanes.xml><?xml version="1.0" encoding="utf-8"?>
 <wetp:taskpanes xmlns:wetp="http://schemas.microsoft.com/office/webextensions/taskpanes/2010/11">
-  <wetp:taskpane dockstate="right" visibility="1" width="350" row="7">
+  <wetp:taskpane dockstate="right" visibility="1" width="350" row="6">
     <wetp:webextensionref xmlns:r="http://schemas.openxmlformats.org/officeDocument/2006/relationships" r:id="rId1"/>
   </wetp:taskpane>
 </wetp:taskpanes>

</xml_diff>

<commit_message>
Missing "Takes" relation in Q3 and Q4
</commit_message>
<xml_diff>
--- a/week_1/week_1.pptx
+++ b/week_1/week_1.pptx
@@ -8520,7 +8520,7 @@
       </p:sp>
       <p:pic>
         <p:nvPicPr>
-          <p:cNvPr id="6" name="Picture 5" descr="A close-up of several numbers&#10;&#10;AI-generated content may be incorrect.">
+          <p:cNvPr id="6" name="Picture 5">
             <a:extLst>
               <a:ext uri="{FF2B5EF4-FFF2-40B4-BE49-F238E27FC236}">
                 <a16:creationId xmlns:a16="http://schemas.microsoft.com/office/drawing/2014/main" id="{F05F48B3-773A-C7B9-6625-405F2174F2E9}"/>
@@ -8545,14 +8545,13 @@
               </a:clrTo>
             </a:clrChange>
           </a:blip>
-          <a:stretch>
-            <a:fillRect/>
-          </a:stretch>
+          <a:srcRect/>
+          <a:stretch/>
         </p:blipFill>
         <p:spPr>
           <a:xfrm>
-            <a:off x="1252537" y="5051683"/>
-            <a:ext cx="6638925" cy="1733550"/>
+            <a:off x="837597" y="4923886"/>
+            <a:ext cx="7634787" cy="1769393"/>
           </a:xfrm>
           <a:prstGeom prst="rect">
             <a:avLst/>
@@ -8760,10 +8759,10 @@
       </p:sp>
       <p:pic>
         <p:nvPicPr>
-          <p:cNvPr id="8" name="Picture 7" descr="A close-up of several numbers&#10;&#10;AI-generated content may be incorrect.">
+          <p:cNvPr id="5" name="Picture 4">
             <a:extLst>
               <a:ext uri="{FF2B5EF4-FFF2-40B4-BE49-F238E27FC236}">
-                <a16:creationId xmlns:a16="http://schemas.microsoft.com/office/drawing/2014/main" id="{99A85ABA-A156-3B49-4822-29D4DFC800E4}"/>
+                <a16:creationId xmlns:a16="http://schemas.microsoft.com/office/drawing/2014/main" id="{5150670B-01DF-56AB-F92D-9D670395A871}"/>
               </a:ext>
             </a:extLst>
           </p:cNvPr>
@@ -8785,14 +8784,13 @@
               </a:clrTo>
             </a:clrChange>
           </a:blip>
-          <a:stretch>
-            <a:fillRect/>
-          </a:stretch>
+          <a:srcRect/>
+          <a:stretch/>
         </p:blipFill>
         <p:spPr>
           <a:xfrm>
-            <a:off x="1252537" y="5051683"/>
-            <a:ext cx="6638925" cy="1733550"/>
+            <a:off x="837597" y="4923886"/>
+            <a:ext cx="7634787" cy="1769393"/>
           </a:xfrm>
           <a:prstGeom prst="rect">
             <a:avLst/>

</xml_diff>